<commit_message>
change rects to images!
</commit_message>
<xml_diff>
--- a/API.pptx
+++ b/API.pptx
@@ -7,6 +7,7 @@
   <p:sldIdLst>
     <p:sldId id="256" r:id="rId2"/>
     <p:sldId id="257" r:id="rId3"/>
+    <p:sldId id="258" r:id="rId4"/>
   </p:sldIdLst>
   <p:sldSz cx="12192000" cy="6858000"/>
   <p:notesSz cx="6858000" cy="9144000"/>
@@ -105,6 +106,11 @@
       </a:defRPr>
     </a:lvl9pPr>
   </p:defaultTextStyle>
+  <p:extLst>
+    <p:ext uri="{EFAFB233-063F-42B5-8137-9DF3F51BA10A}">
+      <p15:sldGuideLst xmlns:p15="http://schemas.microsoft.com/office/powerpoint/2012/main"/>
+    </p:ext>
+  </p:extLst>
 </p:presentation>
 </file>
 
@@ -4360,6 +4366,555 @@
     <p:extLst>
       <p:ext uri="{BB962C8B-B14F-4D97-AF65-F5344CB8AC3E}">
         <p14:creationId xmlns:p14="http://schemas.microsoft.com/office/powerpoint/2010/main" val="1917272522"/>
+      </p:ext>
+    </p:extLst>
+  </p:cSld>
+  <p:clrMapOvr>
+    <a:masterClrMapping/>
+  </p:clrMapOvr>
+</p:sld>
+</file>
+
+<file path=ppt/slides/slide3.xml><?xml version="1.0" encoding="utf-8"?>
+<p:sld xmlns:a="http://schemas.openxmlformats.org/drawingml/2006/main" xmlns:r="http://schemas.openxmlformats.org/officeDocument/2006/relationships" xmlns:p="http://schemas.openxmlformats.org/presentationml/2006/main">
+  <p:cSld>
+    <p:spTree>
+      <p:nvGrpSpPr>
+        <p:cNvPr id="1" name=""/>
+        <p:cNvGrpSpPr/>
+        <p:nvPr/>
+      </p:nvGrpSpPr>
+      <p:grpSpPr>
+        <a:xfrm>
+          <a:off x="0" y="0"/>
+          <a:ext cx="0" cy="0"/>
+          <a:chOff x="0" y="0"/>
+          <a:chExt cx="0" cy="0"/>
+        </a:xfrm>
+      </p:grpSpPr>
+      <p:sp>
+        <p:nvSpPr>
+          <p:cNvPr id="2" name="Title 1">
+            <a:extLst>
+              <a:ext uri="{FF2B5EF4-FFF2-40B4-BE49-F238E27FC236}">
+                <a16:creationId xmlns:a16="http://schemas.microsoft.com/office/drawing/2014/main" id="{CDB63E7E-2B8F-99EE-F3E5-DAB89CFF58F4}"/>
+              </a:ext>
+            </a:extLst>
+          </p:cNvPr>
+          <p:cNvSpPr>
+            <a:spLocks noGrp="1"/>
+          </p:cNvSpPr>
+          <p:nvPr>
+            <p:ph type="title"/>
+          </p:nvPr>
+        </p:nvSpPr>
+        <p:spPr/>
+        <p:txBody>
+          <a:bodyPr/>
+          <a:lstStyle/>
+          <a:p>
+            <a:r>
+              <a:rPr lang="en-US" dirty="0"/>
+              <a:t>Graphics</a:t>
+            </a:r>
+            <a:endParaRPr lang="en-IL" dirty="0"/>
+          </a:p>
+        </p:txBody>
+      </p:sp>
+      <p:pic>
+        <p:nvPicPr>
+          <p:cNvPr id="1026" name="Picture 2">
+            <a:extLst>
+              <a:ext uri="{FF2B5EF4-FFF2-40B4-BE49-F238E27FC236}">
+                <a16:creationId xmlns:a16="http://schemas.microsoft.com/office/drawing/2014/main" id="{CF173184-A52D-9D32-880E-CFB98A3B4344}"/>
+              </a:ext>
+            </a:extLst>
+          </p:cNvPr>
+          <p:cNvPicPr>
+            <a:picLocks noChangeAspect="1" noChangeArrowheads="1"/>
+          </p:cNvPicPr>
+          <p:nvPr/>
+        </p:nvPicPr>
+        <p:blipFill>
+          <a:blip r:embed="rId2">
+            <a:extLst>
+              <a:ext uri="{BEBA8EAE-BF5A-486C-A8C5-ECC9F3942E4B}">
+                <a14:imgProps xmlns:a14="http://schemas.microsoft.com/office/drawing/2010/main">
+                  <a14:imgLayer r:embed="rId3">
+                    <a14:imgEffect>
+                      <a14:backgroundRemoval t="10000" b="90000" l="10000" r="90000"/>
+                    </a14:imgEffect>
+                  </a14:imgLayer>
+                </a14:imgProps>
+              </a:ext>
+              <a:ext uri="{28A0092B-C50C-407E-A947-70E740481C1C}">
+                <a14:useLocalDpi xmlns:a14="http://schemas.microsoft.com/office/drawing/2010/main" val="0"/>
+              </a:ext>
+            </a:extLst>
+          </a:blip>
+          <a:srcRect/>
+          <a:stretch>
+            <a:fillRect/>
+          </a:stretch>
+        </p:blipFill>
+        <p:spPr bwMode="auto">
+          <a:xfrm>
+            <a:off x="3897359" y="1885316"/>
+            <a:ext cx="1393370" cy="1393370"/>
+          </a:xfrm>
+          <a:prstGeom prst="rect">
+            <a:avLst/>
+          </a:prstGeom>
+          <a:noFill/>
+          <a:extLst>
+            <a:ext uri="{909E8E84-426E-40DD-AFC4-6F175D3DCCD1}">
+              <a14:hiddenFill xmlns:a14="http://schemas.microsoft.com/office/drawing/2010/main">
+                <a:solidFill>
+                  <a:srgbClr val="FFFFFF"/>
+                </a:solidFill>
+              </a14:hiddenFill>
+            </a:ext>
+          </a:extLst>
+        </p:spPr>
+      </p:pic>
+      <p:pic>
+        <p:nvPicPr>
+          <p:cNvPr id="4" name="Picture 2">
+            <a:extLst>
+              <a:ext uri="{FF2B5EF4-FFF2-40B4-BE49-F238E27FC236}">
+                <a16:creationId xmlns:a16="http://schemas.microsoft.com/office/drawing/2014/main" id="{2F5CF318-406F-A2A7-CCF9-5B10F014D333}"/>
+              </a:ext>
+            </a:extLst>
+          </p:cNvPr>
+          <p:cNvPicPr>
+            <a:picLocks noChangeAspect="1" noChangeArrowheads="1"/>
+          </p:cNvPicPr>
+          <p:nvPr/>
+        </p:nvPicPr>
+        <p:blipFill>
+          <a:blip r:embed="rId2">
+            <a:duotone>
+              <a:schemeClr val="accent2">
+                <a:shade val="45000"/>
+                <a:satMod val="135000"/>
+              </a:schemeClr>
+              <a:prstClr val="white"/>
+            </a:duotone>
+            <a:extLst>
+              <a:ext uri="{BEBA8EAE-BF5A-486C-A8C5-ECC9F3942E4B}">
+                <a14:imgProps xmlns:a14="http://schemas.microsoft.com/office/drawing/2010/main">
+                  <a14:imgLayer r:embed="rId3">
+                    <a14:imgEffect>
+                      <a14:backgroundRemoval t="10000" b="90000" l="10000" r="90000"/>
+                    </a14:imgEffect>
+                  </a14:imgLayer>
+                </a14:imgProps>
+              </a:ext>
+              <a:ext uri="{28A0092B-C50C-407E-A947-70E740481C1C}">
+                <a14:useLocalDpi xmlns:a14="http://schemas.microsoft.com/office/drawing/2010/main" val="0"/>
+              </a:ext>
+            </a:extLst>
+          </a:blip>
+          <a:srcRect/>
+          <a:stretch>
+            <a:fillRect/>
+          </a:stretch>
+        </p:blipFill>
+        <p:spPr bwMode="auto">
+          <a:xfrm>
+            <a:off x="4021909" y="4066002"/>
+            <a:ext cx="1393370" cy="1393370"/>
+          </a:xfrm>
+          <a:prstGeom prst="rect">
+            <a:avLst/>
+          </a:prstGeom>
+          <a:noFill/>
+          <a:extLst>
+            <a:ext uri="{909E8E84-426E-40DD-AFC4-6F175D3DCCD1}">
+              <a14:hiddenFill xmlns:a14="http://schemas.microsoft.com/office/drawing/2010/main">
+                <a:solidFill>
+                  <a:srgbClr val="FFFFFF"/>
+                </a:solidFill>
+              </a14:hiddenFill>
+            </a:ext>
+          </a:extLst>
+        </p:spPr>
+      </p:pic>
+      <p:pic>
+        <p:nvPicPr>
+          <p:cNvPr id="5" name="Picture 2">
+            <a:extLst>
+              <a:ext uri="{FF2B5EF4-FFF2-40B4-BE49-F238E27FC236}">
+                <a16:creationId xmlns:a16="http://schemas.microsoft.com/office/drawing/2014/main" id="{ADBA1CFB-417A-3F22-2D1D-552CFCD2C8F4}"/>
+              </a:ext>
+            </a:extLst>
+          </p:cNvPr>
+          <p:cNvPicPr>
+            <a:picLocks noChangeAspect="1" noChangeArrowheads="1"/>
+          </p:cNvPicPr>
+          <p:nvPr/>
+        </p:nvPicPr>
+        <p:blipFill>
+          <a:blip r:embed="rId2">
+            <a:duotone>
+              <a:schemeClr val="accent1">
+                <a:shade val="45000"/>
+                <a:satMod val="135000"/>
+              </a:schemeClr>
+              <a:prstClr val="white"/>
+            </a:duotone>
+            <a:extLst>
+              <a:ext uri="{BEBA8EAE-BF5A-486C-A8C5-ECC9F3942E4B}">
+                <a14:imgProps xmlns:a14="http://schemas.microsoft.com/office/drawing/2010/main">
+                  <a14:imgLayer r:embed="rId3">
+                    <a14:imgEffect>
+                      <a14:backgroundRemoval t="10000" b="90000" l="10000" r="90000"/>
+                    </a14:imgEffect>
+                  </a14:imgLayer>
+                </a14:imgProps>
+              </a:ext>
+              <a:ext uri="{28A0092B-C50C-407E-A947-70E740481C1C}">
+                <a14:useLocalDpi xmlns:a14="http://schemas.microsoft.com/office/drawing/2010/main" val="0"/>
+              </a:ext>
+            </a:extLst>
+          </a:blip>
+          <a:srcRect/>
+          <a:stretch>
+            <a:fillRect/>
+          </a:stretch>
+        </p:blipFill>
+        <p:spPr bwMode="auto">
+          <a:xfrm>
+            <a:off x="3897359" y="2975659"/>
+            <a:ext cx="1393370" cy="1393370"/>
+          </a:xfrm>
+          <a:prstGeom prst="rect">
+            <a:avLst/>
+          </a:prstGeom>
+          <a:noFill/>
+          <a:extLst>
+            <a:ext uri="{909E8E84-426E-40DD-AFC4-6F175D3DCCD1}">
+              <a14:hiddenFill xmlns:a14="http://schemas.microsoft.com/office/drawing/2010/main">
+                <a:solidFill>
+                  <a:srgbClr val="FFFFFF"/>
+                </a:solidFill>
+              </a14:hiddenFill>
+            </a:ext>
+          </a:extLst>
+        </p:spPr>
+      </p:pic>
+      <p:pic>
+        <p:nvPicPr>
+          <p:cNvPr id="1028" name="Picture 4">
+            <a:extLst>
+              <a:ext uri="{FF2B5EF4-FFF2-40B4-BE49-F238E27FC236}">
+                <a16:creationId xmlns:a16="http://schemas.microsoft.com/office/drawing/2014/main" id="{3B80866C-D146-A90A-84C1-C980818B1D04}"/>
+              </a:ext>
+            </a:extLst>
+          </p:cNvPr>
+          <p:cNvPicPr>
+            <a:picLocks noChangeAspect="1" noChangeArrowheads="1"/>
+          </p:cNvPicPr>
+          <p:nvPr/>
+        </p:nvPicPr>
+        <p:blipFill rotWithShape="1">
+          <a:blip r:embed="rId4">
+            <a:extLst>
+              <a:ext uri="{28A0092B-C50C-407E-A947-70E740481C1C}">
+                <a14:useLocalDpi xmlns:a14="http://schemas.microsoft.com/office/drawing/2010/main" val="0"/>
+              </a:ext>
+            </a:extLst>
+          </a:blip>
+          <a:srcRect b="29129"/>
+          <a:stretch/>
+        </p:blipFill>
+        <p:spPr bwMode="auto">
+          <a:xfrm>
+            <a:off x="6333814" y="2114523"/>
+            <a:ext cx="1290113" cy="833120"/>
+          </a:xfrm>
+          <a:prstGeom prst="rect">
+            <a:avLst/>
+          </a:prstGeom>
+          <a:noFill/>
+          <a:extLst>
+            <a:ext uri="{909E8E84-426E-40DD-AFC4-6F175D3DCCD1}">
+              <a14:hiddenFill xmlns:a14="http://schemas.microsoft.com/office/drawing/2010/main">
+                <a:solidFill>
+                  <a:srgbClr val="FFFFFF"/>
+                </a:solidFill>
+              </a14:hiddenFill>
+            </a:ext>
+          </a:extLst>
+        </p:spPr>
+      </p:pic>
+      <p:pic>
+        <p:nvPicPr>
+          <p:cNvPr id="1032" name="Picture 8">
+            <a:extLst>
+              <a:ext uri="{FF2B5EF4-FFF2-40B4-BE49-F238E27FC236}">
+                <a16:creationId xmlns:a16="http://schemas.microsoft.com/office/drawing/2014/main" id="{146020AB-0E7A-6181-CBFF-1DB004EBAC15}"/>
+              </a:ext>
+            </a:extLst>
+          </p:cNvPr>
+          <p:cNvPicPr>
+            <a:picLocks noChangeAspect="1" noChangeArrowheads="1"/>
+          </p:cNvPicPr>
+          <p:nvPr/>
+        </p:nvPicPr>
+        <p:blipFill rotWithShape="1">
+          <a:blip r:embed="rId5">
+            <a:extLst>
+              <a:ext uri="{28A0092B-C50C-407E-A947-70E740481C1C}">
+                <a14:useLocalDpi xmlns:a14="http://schemas.microsoft.com/office/drawing/2010/main" val="0"/>
+              </a:ext>
+            </a:extLst>
+          </a:blip>
+          <a:srcRect b="26228"/>
+          <a:stretch/>
+        </p:blipFill>
+        <p:spPr bwMode="auto">
+          <a:xfrm>
+            <a:off x="7940914" y="3240266"/>
+            <a:ext cx="1047135" cy="723901"/>
+          </a:xfrm>
+          <a:prstGeom prst="rect">
+            <a:avLst/>
+          </a:prstGeom>
+          <a:noFill/>
+          <a:extLst>
+            <a:ext uri="{909E8E84-426E-40DD-AFC4-6F175D3DCCD1}">
+              <a14:hiddenFill xmlns:a14="http://schemas.microsoft.com/office/drawing/2010/main">
+                <a:solidFill>
+                  <a:srgbClr val="FFFFFF"/>
+                </a:solidFill>
+              </a14:hiddenFill>
+            </a:ext>
+          </a:extLst>
+        </p:spPr>
+      </p:pic>
+      <p:pic>
+        <p:nvPicPr>
+          <p:cNvPr id="7" name="Picture 4">
+            <a:extLst>
+              <a:ext uri="{FF2B5EF4-FFF2-40B4-BE49-F238E27FC236}">
+                <a16:creationId xmlns:a16="http://schemas.microsoft.com/office/drawing/2014/main" id="{4B1B29CC-7EB1-0D0E-D0DF-D44B59160E02}"/>
+              </a:ext>
+            </a:extLst>
+          </p:cNvPr>
+          <p:cNvPicPr>
+            <a:picLocks noChangeAspect="1" noChangeArrowheads="1"/>
+          </p:cNvPicPr>
+          <p:nvPr/>
+        </p:nvPicPr>
+        <p:blipFill rotWithShape="1">
+          <a:blip r:embed="rId4">
+            <a:extLst>
+              <a:ext uri="{28A0092B-C50C-407E-A947-70E740481C1C}">
+                <a14:useLocalDpi xmlns:a14="http://schemas.microsoft.com/office/drawing/2010/main" val="0"/>
+              </a:ext>
+            </a:extLst>
+          </a:blip>
+          <a:srcRect b="29129"/>
+          <a:stretch/>
+        </p:blipFill>
+        <p:spPr bwMode="auto">
+          <a:xfrm>
+            <a:off x="6319099" y="3185657"/>
+            <a:ext cx="1290113" cy="833120"/>
+          </a:xfrm>
+          <a:prstGeom prst="rect">
+            <a:avLst/>
+          </a:prstGeom>
+          <a:noFill/>
+          <a:extLst>
+            <a:ext uri="{909E8E84-426E-40DD-AFC4-6F175D3DCCD1}">
+              <a14:hiddenFill xmlns:a14="http://schemas.microsoft.com/office/drawing/2010/main">
+                <a:solidFill>
+                  <a:srgbClr val="FFFFFF"/>
+                </a:solidFill>
+              </a14:hiddenFill>
+            </a:ext>
+          </a:extLst>
+        </p:spPr>
+      </p:pic>
+      <p:pic>
+        <p:nvPicPr>
+          <p:cNvPr id="1030" name="Picture 6">
+            <a:extLst>
+              <a:ext uri="{FF2B5EF4-FFF2-40B4-BE49-F238E27FC236}">
+                <a16:creationId xmlns:a16="http://schemas.microsoft.com/office/drawing/2014/main" id="{21B21816-9220-0C65-F3D6-EFC620E1C245}"/>
+              </a:ext>
+            </a:extLst>
+          </p:cNvPr>
+          <p:cNvPicPr>
+            <a:picLocks noChangeAspect="1" noChangeArrowheads="1"/>
+          </p:cNvPicPr>
+          <p:nvPr/>
+        </p:nvPicPr>
+        <p:blipFill>
+          <a:blip r:embed="rId6">
+            <a:clrChange>
+              <a:clrFrom>
+                <a:srgbClr val="FFFFFF"/>
+              </a:clrFrom>
+              <a:clrTo>
+                <a:srgbClr val="FFFFFF">
+                  <a:alpha val="0"/>
+                </a:srgbClr>
+              </a:clrTo>
+            </a:clrChange>
+            <a:duotone>
+              <a:schemeClr val="accent1">
+                <a:shade val="45000"/>
+                <a:satMod val="135000"/>
+              </a:schemeClr>
+              <a:prstClr val="white"/>
+            </a:duotone>
+            <a:extLst>
+              <a:ext uri="{28A0092B-C50C-407E-A947-70E740481C1C}">
+                <a14:useLocalDpi xmlns:a14="http://schemas.microsoft.com/office/drawing/2010/main" val="0"/>
+              </a:ext>
+            </a:extLst>
+          </a:blip>
+          <a:srcRect/>
+          <a:stretch>
+            <a:fillRect/>
+          </a:stretch>
+        </p:blipFill>
+        <p:spPr bwMode="auto">
+          <a:xfrm>
+            <a:off x="7174369" y="3402220"/>
+            <a:ext cx="663782" cy="663782"/>
+          </a:xfrm>
+          <a:prstGeom prst="rect">
+            <a:avLst/>
+          </a:prstGeom>
+          <a:noFill/>
+          <a:extLst>
+            <a:ext uri="{909E8E84-426E-40DD-AFC4-6F175D3DCCD1}">
+              <a14:hiddenFill xmlns:a14="http://schemas.microsoft.com/office/drawing/2010/main">
+                <a:solidFill>
+                  <a:srgbClr val="FFFFFF"/>
+                </a:solidFill>
+              </a14:hiddenFill>
+            </a:ext>
+          </a:extLst>
+        </p:spPr>
+      </p:pic>
+      <p:pic>
+        <p:nvPicPr>
+          <p:cNvPr id="8" name="Picture 4">
+            <a:extLst>
+              <a:ext uri="{FF2B5EF4-FFF2-40B4-BE49-F238E27FC236}">
+                <a16:creationId xmlns:a16="http://schemas.microsoft.com/office/drawing/2014/main" id="{2A2338FD-948C-944A-6E63-C3CE83FE5AF1}"/>
+              </a:ext>
+            </a:extLst>
+          </p:cNvPr>
+          <p:cNvPicPr>
+            <a:picLocks noChangeAspect="1" noChangeArrowheads="1"/>
+          </p:cNvPicPr>
+          <p:nvPr/>
+        </p:nvPicPr>
+        <p:blipFill rotWithShape="1">
+          <a:blip r:embed="rId4">
+            <a:extLst>
+              <a:ext uri="{28A0092B-C50C-407E-A947-70E740481C1C}">
+                <a14:useLocalDpi xmlns:a14="http://schemas.microsoft.com/office/drawing/2010/main" val="0"/>
+              </a:ext>
+            </a:extLst>
+          </a:blip>
+          <a:srcRect b="29129"/>
+          <a:stretch/>
+        </p:blipFill>
+        <p:spPr bwMode="auto">
+          <a:xfrm>
+            <a:off x="6204134" y="4273274"/>
+            <a:ext cx="1290113" cy="833120"/>
+          </a:xfrm>
+          <a:prstGeom prst="rect">
+            <a:avLst/>
+          </a:prstGeom>
+          <a:noFill/>
+          <a:extLst>
+            <a:ext uri="{909E8E84-426E-40DD-AFC4-6F175D3DCCD1}">
+              <a14:hiddenFill xmlns:a14="http://schemas.microsoft.com/office/drawing/2010/main">
+                <a:solidFill>
+                  <a:srgbClr val="FFFFFF"/>
+                </a:solidFill>
+              </a14:hiddenFill>
+            </a:ext>
+          </a:extLst>
+        </p:spPr>
+      </p:pic>
+      <p:pic>
+        <p:nvPicPr>
+          <p:cNvPr id="9" name="Picture 6">
+            <a:extLst>
+              <a:ext uri="{FF2B5EF4-FFF2-40B4-BE49-F238E27FC236}">
+                <a16:creationId xmlns:a16="http://schemas.microsoft.com/office/drawing/2014/main" id="{C0682BF0-0526-9270-A5D6-9E1747974B1B}"/>
+              </a:ext>
+            </a:extLst>
+          </p:cNvPr>
+          <p:cNvPicPr>
+            <a:picLocks noChangeAspect="1" noChangeArrowheads="1"/>
+          </p:cNvPicPr>
+          <p:nvPr/>
+        </p:nvPicPr>
+        <p:blipFill>
+          <a:blip r:embed="rId6">
+            <a:clrChange>
+              <a:clrFrom>
+                <a:srgbClr val="FFFFFF"/>
+              </a:clrFrom>
+              <a:clrTo>
+                <a:srgbClr val="FFFFFF">
+                  <a:alpha val="0"/>
+                </a:srgbClr>
+              </a:clrTo>
+            </a:clrChange>
+            <a:duotone>
+              <a:schemeClr val="accent2">
+                <a:shade val="45000"/>
+                <a:satMod val="135000"/>
+              </a:schemeClr>
+              <a:prstClr val="white"/>
+            </a:duotone>
+            <a:extLst>
+              <a:ext uri="{28A0092B-C50C-407E-A947-70E740481C1C}">
+                <a14:useLocalDpi xmlns:a14="http://schemas.microsoft.com/office/drawing/2010/main" val="0"/>
+              </a:ext>
+            </a:extLst>
+          </a:blip>
+          <a:srcRect/>
+          <a:stretch>
+            <a:fillRect/>
+          </a:stretch>
+        </p:blipFill>
+        <p:spPr bwMode="auto">
+          <a:xfrm>
+            <a:off x="7059404" y="4489837"/>
+            <a:ext cx="663781" cy="663781"/>
+          </a:xfrm>
+          <a:prstGeom prst="rect">
+            <a:avLst/>
+          </a:prstGeom>
+          <a:noFill/>
+          <a:extLst>
+            <a:ext uri="{909E8E84-426E-40DD-AFC4-6F175D3DCCD1}">
+              <a14:hiddenFill xmlns:a14="http://schemas.microsoft.com/office/drawing/2010/main">
+                <a:solidFill>
+                  <a:srgbClr val="FFFFFF"/>
+                </a:solidFill>
+              </a14:hiddenFill>
+            </a:ext>
+          </a:extLst>
+        </p:spPr>
+      </p:pic>
+    </p:spTree>
+    <p:extLst>
+      <p:ext uri="{BB962C8B-B14F-4D97-AF65-F5344CB8AC3E}">
+        <p14:creationId xmlns:p14="http://schemas.microsoft.com/office/powerpoint/2010/main" val="996935666"/>
       </p:ext>
     </p:extLst>
   </p:cSld>

</xml_diff>